<commit_message>
edit report and ppt
</commit_message>
<xml_diff>
--- a/NLP.pptx
+++ b/NLP.pptx
@@ -8,10 +8,10 @@
     <p:sldMasterId id="2147483724" r:id="rId4"/>
   </p:sldMasterIdLst>
   <p:notesMasterIdLst>
-    <p:notesMasterId r:id="rId11"/>
+    <p:notesMasterId r:id="rId15"/>
   </p:notesMasterIdLst>
   <p:handoutMasterIdLst>
-    <p:handoutMasterId r:id="rId12"/>
+    <p:handoutMasterId r:id="rId16"/>
   </p:handoutMasterIdLst>
   <p:sldIdLst>
     <p:sldId id="446" r:id="rId5"/>
@@ -20,6 +20,10 @@
     <p:sldId id="448" r:id="rId8"/>
     <p:sldId id="449" r:id="rId9"/>
     <p:sldId id="450" r:id="rId10"/>
+    <p:sldId id="451" r:id="rId11"/>
+    <p:sldId id="452" r:id="rId12"/>
+    <p:sldId id="453" r:id="rId13"/>
+    <p:sldId id="454" r:id="rId14"/>
   </p:sldIdLst>
   <p:sldSz cx="12192000" cy="6858000"/>
   <p:notesSz cx="6858000" cy="9144000"/>
@@ -6918,7 +6922,7 @@
         </p:blipFill>
         <p:spPr>
           <a:xfrm>
-            <a:off x="225" y="0"/>
+            <a:off x="225" y="15902"/>
             <a:ext cx="12191550" cy="6857999"/>
           </a:xfrm>
         </p:spPr>
@@ -6974,6 +6978,154 @@
     <p:extLst>
       <p:ext uri="{BB962C8B-B14F-4D97-AF65-F5344CB8AC3E}">
         <p14:creationId xmlns:p14="http://schemas.microsoft.com/office/powerpoint/2010/main" val="1558315191"/>
+      </p:ext>
+    </p:extLst>
+  </p:cSld>
+  <p:clrMapOvr>
+    <a:masterClrMapping/>
+  </p:clrMapOvr>
+</p:sld>
+</file>
+
+<file path=ppt/slides/slide10.xml><?xml version="1.0" encoding="utf-8"?>
+<p:sld xmlns:a="http://schemas.openxmlformats.org/drawingml/2006/main" xmlns:r="http://schemas.openxmlformats.org/officeDocument/2006/relationships" xmlns:p="http://schemas.openxmlformats.org/presentationml/2006/main">
+  <p:cSld>
+    <p:spTree>
+      <p:nvGrpSpPr>
+        <p:cNvPr id="1" name=""/>
+        <p:cNvGrpSpPr/>
+        <p:nvPr/>
+      </p:nvGrpSpPr>
+      <p:grpSpPr>
+        <a:xfrm>
+          <a:off x="0" y="0"/>
+          <a:ext cx="0" cy="0"/>
+          <a:chOff x="0" y="0"/>
+          <a:chExt cx="0" cy="0"/>
+        </a:xfrm>
+      </p:grpSpPr>
+      <p:sp>
+        <p:nvSpPr>
+          <p:cNvPr id="2" name="Title 1">
+            <a:extLst>
+              <a:ext uri="{FF2B5EF4-FFF2-40B4-BE49-F238E27FC236}">
+                <a16:creationId xmlns:a16="http://schemas.microsoft.com/office/drawing/2014/main" id="{C6E4143E-73AC-4F88-A0EF-C51C0B27B698}"/>
+              </a:ext>
+            </a:extLst>
+          </p:cNvPr>
+          <p:cNvSpPr>
+            <a:spLocks noGrp="1"/>
+          </p:cNvSpPr>
+          <p:nvPr>
+            <p:ph type="title"/>
+          </p:nvPr>
+        </p:nvSpPr>
+        <p:spPr/>
+        <p:txBody>
+          <a:bodyPr/>
+          <a:lstStyle/>
+          <a:p>
+            <a:r>
+              <a:rPr lang="en-HK" dirty="0"/>
+              <a:t>Naive Bayes classifier</a:t>
+            </a:r>
+          </a:p>
+        </p:txBody>
+      </p:sp>
+      <p:sp>
+        <p:nvSpPr>
+          <p:cNvPr id="3" name="Text Placeholder 2">
+            <a:extLst>
+              <a:ext uri="{FF2B5EF4-FFF2-40B4-BE49-F238E27FC236}">
+                <a16:creationId xmlns:a16="http://schemas.microsoft.com/office/drawing/2014/main" id="{C4B98258-5E27-4589-9F5A-10AC611F228D}"/>
+              </a:ext>
+            </a:extLst>
+          </p:cNvPr>
+          <p:cNvSpPr>
+            <a:spLocks noGrp="1"/>
+          </p:cNvSpPr>
+          <p:nvPr>
+            <p:ph type="body" sz="quarter" idx="14"/>
+          </p:nvPr>
+        </p:nvSpPr>
+        <p:spPr/>
+        <p:txBody>
+          <a:bodyPr/>
+          <a:lstStyle/>
+          <a:p>
+            <a:pPr marL="285750" indent="-285750">
+              <a:buFont typeface="Arial" panose="020B0604020202020204" pitchFamily="34" charset="0"/>
+              <a:buChar char="•"/>
+            </a:pPr>
+            <a:r>
+              <a:rPr lang="en-HK" dirty="0"/>
+              <a:t>Create Naïve Bayes Classifier </a:t>
+            </a:r>
+          </a:p>
+          <a:p>
+            <a:pPr marL="285750" indent="-285750">
+              <a:buFont typeface="Arial" panose="020B0604020202020204" pitchFamily="34" charset="0"/>
+              <a:buChar char="•"/>
+            </a:pPr>
+            <a:r>
+              <a:rPr lang="en-HK" dirty="0"/>
+              <a:t>Train the classifier using the 75% training data</a:t>
+            </a:r>
+          </a:p>
+        </p:txBody>
+      </p:sp>
+      <p:sp>
+        <p:nvSpPr>
+          <p:cNvPr id="4" name="Picture Placeholder 3">
+            <a:extLst>
+              <a:ext uri="{FF2B5EF4-FFF2-40B4-BE49-F238E27FC236}">
+                <a16:creationId xmlns:a16="http://schemas.microsoft.com/office/drawing/2014/main" id="{FA168B5C-8BBC-4511-81E3-B255A036E643}"/>
+              </a:ext>
+            </a:extLst>
+          </p:cNvPr>
+          <p:cNvSpPr>
+            <a:spLocks noGrp="1"/>
+          </p:cNvSpPr>
+          <p:nvPr>
+            <p:ph type="pic" sz="quarter" idx="15"/>
+          </p:nvPr>
+        </p:nvSpPr>
+        <p:spPr/>
+      </p:sp>
+      <p:pic>
+        <p:nvPicPr>
+          <p:cNvPr id="8" name="Picture 7">
+            <a:extLst>
+              <a:ext uri="{FF2B5EF4-FFF2-40B4-BE49-F238E27FC236}">
+                <a16:creationId xmlns:a16="http://schemas.microsoft.com/office/drawing/2014/main" id="{27ED4761-688E-4F67-A591-DD704E160AAA}"/>
+              </a:ext>
+            </a:extLst>
+          </p:cNvPr>
+          <p:cNvPicPr>
+            <a:picLocks noChangeAspect="1"/>
+          </p:cNvPicPr>
+          <p:nvPr/>
+        </p:nvPicPr>
+        <p:blipFill>
+          <a:blip r:embed="rId2"/>
+          <a:stretch>
+            <a:fillRect/>
+          </a:stretch>
+        </p:blipFill>
+        <p:spPr>
+          <a:xfrm>
+            <a:off x="7030254" y="2715909"/>
+            <a:ext cx="4858428" cy="1171739"/>
+          </a:xfrm>
+          <a:prstGeom prst="rect">
+            <a:avLst/>
+          </a:prstGeom>
+        </p:spPr>
+      </p:pic>
+    </p:spTree>
+    <p:extLst>
+      <p:ext uri="{BB962C8B-B14F-4D97-AF65-F5344CB8AC3E}">
+        <p14:creationId xmlns:p14="http://schemas.microsoft.com/office/powerpoint/2010/main" val="2370994087"/>
       </p:ext>
     </p:extLst>
   </p:cSld>
@@ -7914,6 +8066,718 @@
     <p:extLst>
       <p:ext uri="{BB962C8B-B14F-4D97-AF65-F5344CB8AC3E}">
         <p14:creationId xmlns:p14="http://schemas.microsoft.com/office/powerpoint/2010/main" val="4053989545"/>
+      </p:ext>
+    </p:extLst>
+  </p:cSld>
+  <p:clrMapOvr>
+    <a:masterClrMapping/>
+  </p:clrMapOvr>
+</p:sld>
+</file>
+
+<file path=ppt/slides/slide7.xml><?xml version="1.0" encoding="utf-8"?>
+<p:sld xmlns:a="http://schemas.openxmlformats.org/drawingml/2006/main" xmlns:r="http://schemas.openxmlformats.org/officeDocument/2006/relationships" xmlns:p="http://schemas.openxmlformats.org/presentationml/2006/main">
+  <p:cSld>
+    <p:spTree>
+      <p:nvGrpSpPr>
+        <p:cNvPr id="1" name=""/>
+        <p:cNvGrpSpPr/>
+        <p:nvPr/>
+      </p:nvGrpSpPr>
+      <p:grpSpPr>
+        <a:xfrm>
+          <a:off x="0" y="0"/>
+          <a:ext cx="0" cy="0"/>
+          <a:chOff x="0" y="0"/>
+          <a:chExt cx="0" cy="0"/>
+        </a:xfrm>
+      </p:grpSpPr>
+      <p:sp>
+        <p:nvSpPr>
+          <p:cNvPr id="2" name="Title 1">
+            <a:extLst>
+              <a:ext uri="{FF2B5EF4-FFF2-40B4-BE49-F238E27FC236}">
+                <a16:creationId xmlns:a16="http://schemas.microsoft.com/office/drawing/2014/main" id="{E0D88D86-29B6-40C2-A62C-0C9F7C5AF0DE}"/>
+              </a:ext>
+            </a:extLst>
+          </p:cNvPr>
+          <p:cNvSpPr>
+            <a:spLocks noGrp="1"/>
+          </p:cNvSpPr>
+          <p:nvPr>
+            <p:ph type="title"/>
+          </p:nvPr>
+        </p:nvSpPr>
+        <p:spPr/>
+        <p:txBody>
+          <a:bodyPr/>
+          <a:lstStyle/>
+          <a:p>
+            <a:r>
+              <a:rPr lang="en-HK" dirty="0" err="1"/>
+              <a:t>Tf-idf</a:t>
+            </a:r>
+            <a:r>
+              <a:rPr lang="en-HK" dirty="0"/>
+              <a:t> Transformer</a:t>
+            </a:r>
+          </a:p>
+        </p:txBody>
+      </p:sp>
+      <p:sp>
+        <p:nvSpPr>
+          <p:cNvPr id="3" name="Text Placeholder 2">
+            <a:extLst>
+              <a:ext uri="{FF2B5EF4-FFF2-40B4-BE49-F238E27FC236}">
+                <a16:creationId xmlns:a16="http://schemas.microsoft.com/office/drawing/2014/main" id="{BC69A540-2FBC-4FB2-87B5-FA29FD87BF79}"/>
+              </a:ext>
+            </a:extLst>
+          </p:cNvPr>
+          <p:cNvSpPr>
+            <a:spLocks noGrp="1"/>
+          </p:cNvSpPr>
+          <p:nvPr>
+            <p:ph type="body" sz="quarter" idx="14"/>
+          </p:nvPr>
+        </p:nvSpPr>
+        <p:spPr/>
+        <p:txBody>
+          <a:bodyPr/>
+          <a:lstStyle/>
+          <a:p>
+            <a:pPr marL="285750" indent="-285750">
+              <a:buFont typeface="Arial" panose="020B0604020202020204" pitchFamily="34" charset="0"/>
+              <a:buChar char="•"/>
+            </a:pPr>
+            <a:r>
+              <a:rPr lang="en-HK" dirty="0"/>
+              <a:t>Downscale the transformed data using </a:t>
+            </a:r>
+            <a:r>
+              <a:rPr lang="en-HK" dirty="0" err="1"/>
+              <a:t>tf-idf</a:t>
+            </a:r>
+            <a:r>
+              <a:rPr lang="en-HK" dirty="0"/>
+              <a:t> </a:t>
+            </a:r>
+          </a:p>
+          <a:p>
+            <a:pPr marL="285750" indent="-285750">
+              <a:buFont typeface="Arial" panose="020B0604020202020204" pitchFamily="34" charset="0"/>
+              <a:buChar char="•"/>
+            </a:pPr>
+            <a:r>
+              <a:rPr lang="en-HK" dirty="0"/>
+              <a:t>Place data into </a:t>
+            </a:r>
+            <a:r>
+              <a:rPr lang="en-HK" dirty="0" err="1"/>
+              <a:t>dataframe</a:t>
+            </a:r>
+            <a:r>
+              <a:rPr lang="en-HK" dirty="0"/>
+              <a:t> for shuffle and split</a:t>
+            </a:r>
+          </a:p>
+        </p:txBody>
+      </p:sp>
+      <p:sp>
+        <p:nvSpPr>
+          <p:cNvPr id="4" name="Picture Placeholder 3">
+            <a:extLst>
+              <a:ext uri="{FF2B5EF4-FFF2-40B4-BE49-F238E27FC236}">
+                <a16:creationId xmlns:a16="http://schemas.microsoft.com/office/drawing/2014/main" id="{A25711B3-B446-4031-9BB4-4C8B85B27AC5}"/>
+              </a:ext>
+            </a:extLst>
+          </p:cNvPr>
+          <p:cNvSpPr>
+            <a:spLocks noGrp="1"/>
+          </p:cNvSpPr>
+          <p:nvPr>
+            <p:ph type="pic" sz="quarter" idx="15"/>
+          </p:nvPr>
+        </p:nvSpPr>
+        <p:spPr/>
+      </p:sp>
+      <p:pic>
+        <p:nvPicPr>
+          <p:cNvPr id="6" name="Picture 5">
+            <a:extLst>
+              <a:ext uri="{FF2B5EF4-FFF2-40B4-BE49-F238E27FC236}">
+                <a16:creationId xmlns:a16="http://schemas.microsoft.com/office/drawing/2014/main" id="{3D50CC52-B612-4834-9C19-69F80A38A412}"/>
+              </a:ext>
+            </a:extLst>
+          </p:cNvPr>
+          <p:cNvPicPr>
+            <a:picLocks noChangeAspect="1"/>
+          </p:cNvPicPr>
+          <p:nvPr/>
+        </p:nvPicPr>
+        <p:blipFill>
+          <a:blip r:embed="rId2"/>
+          <a:stretch>
+            <a:fillRect/>
+          </a:stretch>
+        </p:blipFill>
+        <p:spPr>
+          <a:xfrm>
+            <a:off x="5625057" y="333576"/>
+            <a:ext cx="6487430" cy="2152950"/>
+          </a:xfrm>
+          <a:prstGeom prst="rect">
+            <a:avLst/>
+          </a:prstGeom>
+        </p:spPr>
+      </p:pic>
+      <p:pic>
+        <p:nvPicPr>
+          <p:cNvPr id="8" name="Picture 7">
+            <a:extLst>
+              <a:ext uri="{FF2B5EF4-FFF2-40B4-BE49-F238E27FC236}">
+                <a16:creationId xmlns:a16="http://schemas.microsoft.com/office/drawing/2014/main" id="{F73B0BD3-1ED8-40E9-A627-0A766B7CECC8}"/>
+              </a:ext>
+            </a:extLst>
+          </p:cNvPr>
+          <p:cNvPicPr>
+            <a:picLocks noChangeAspect="1"/>
+          </p:cNvPicPr>
+          <p:nvPr/>
+        </p:nvPicPr>
+        <p:blipFill>
+          <a:blip r:embed="rId3"/>
+          <a:stretch>
+            <a:fillRect/>
+          </a:stretch>
+        </p:blipFill>
+        <p:spPr>
+          <a:xfrm>
+            <a:off x="5658038" y="2486526"/>
+            <a:ext cx="2991267" cy="1381318"/>
+          </a:xfrm>
+          <a:prstGeom prst="rect">
+            <a:avLst/>
+          </a:prstGeom>
+        </p:spPr>
+      </p:pic>
+      <p:pic>
+        <p:nvPicPr>
+          <p:cNvPr id="12" name="Picture 11">
+            <a:extLst>
+              <a:ext uri="{FF2B5EF4-FFF2-40B4-BE49-F238E27FC236}">
+                <a16:creationId xmlns:a16="http://schemas.microsoft.com/office/drawing/2014/main" id="{92ADBE13-730C-4C48-8842-AD8C3BD2797F}"/>
+              </a:ext>
+            </a:extLst>
+          </p:cNvPr>
+          <p:cNvPicPr>
+            <a:picLocks noChangeAspect="1"/>
+          </p:cNvPicPr>
+          <p:nvPr/>
+        </p:nvPicPr>
+        <p:blipFill>
+          <a:blip r:embed="rId4"/>
+          <a:stretch>
+            <a:fillRect/>
+          </a:stretch>
+        </p:blipFill>
+        <p:spPr>
+          <a:xfrm>
+            <a:off x="5800932" y="3867844"/>
+            <a:ext cx="2705478" cy="1000265"/>
+          </a:xfrm>
+          <a:prstGeom prst="rect">
+            <a:avLst/>
+          </a:prstGeom>
+        </p:spPr>
+      </p:pic>
+      <p:pic>
+        <p:nvPicPr>
+          <p:cNvPr id="18" name="Picture 17">
+            <a:extLst>
+              <a:ext uri="{FF2B5EF4-FFF2-40B4-BE49-F238E27FC236}">
+                <a16:creationId xmlns:a16="http://schemas.microsoft.com/office/drawing/2014/main" id="{78F47142-26AD-4B4B-84FC-B0BBE257E8DD}"/>
+              </a:ext>
+            </a:extLst>
+          </p:cNvPr>
+          <p:cNvPicPr>
+            <a:picLocks noChangeAspect="1"/>
+          </p:cNvPicPr>
+          <p:nvPr/>
+        </p:nvPicPr>
+        <p:blipFill>
+          <a:blip r:embed="rId5"/>
+          <a:stretch>
+            <a:fillRect/>
+          </a:stretch>
+        </p:blipFill>
+        <p:spPr>
+          <a:xfrm>
+            <a:off x="5820485" y="4868109"/>
+            <a:ext cx="2667372" cy="724001"/>
+          </a:xfrm>
+          <a:prstGeom prst="rect">
+            <a:avLst/>
+          </a:prstGeom>
+        </p:spPr>
+      </p:pic>
+      <p:pic>
+        <p:nvPicPr>
+          <p:cNvPr id="20" name="Picture 19">
+            <a:extLst>
+              <a:ext uri="{FF2B5EF4-FFF2-40B4-BE49-F238E27FC236}">
+                <a16:creationId xmlns:a16="http://schemas.microsoft.com/office/drawing/2014/main" id="{5A8641C8-9542-4A50-8B21-8CCAFB340B2C}"/>
+              </a:ext>
+            </a:extLst>
+          </p:cNvPr>
+          <p:cNvPicPr>
+            <a:picLocks noChangeAspect="1"/>
+          </p:cNvPicPr>
+          <p:nvPr/>
+        </p:nvPicPr>
+        <p:blipFill>
+          <a:blip r:embed="rId6"/>
+          <a:stretch>
+            <a:fillRect/>
+          </a:stretch>
+        </p:blipFill>
+        <p:spPr>
+          <a:xfrm>
+            <a:off x="8499164" y="3311444"/>
+            <a:ext cx="3553321" cy="2962688"/>
+          </a:xfrm>
+          <a:prstGeom prst="rect">
+            <a:avLst/>
+          </a:prstGeom>
+        </p:spPr>
+      </p:pic>
+    </p:spTree>
+    <p:extLst>
+      <p:ext uri="{BB962C8B-B14F-4D97-AF65-F5344CB8AC3E}">
+        <p14:creationId xmlns:p14="http://schemas.microsoft.com/office/powerpoint/2010/main" val="2275128890"/>
+      </p:ext>
+    </p:extLst>
+  </p:cSld>
+  <p:clrMapOvr>
+    <a:masterClrMapping/>
+  </p:clrMapOvr>
+</p:sld>
+</file>
+
+<file path=ppt/slides/slide8.xml><?xml version="1.0" encoding="utf-8"?>
+<p:sld xmlns:a="http://schemas.openxmlformats.org/drawingml/2006/main" xmlns:r="http://schemas.openxmlformats.org/officeDocument/2006/relationships" xmlns:p="http://schemas.openxmlformats.org/presentationml/2006/main">
+  <p:cSld>
+    <p:spTree>
+      <p:nvGrpSpPr>
+        <p:cNvPr id="1" name=""/>
+        <p:cNvGrpSpPr/>
+        <p:nvPr/>
+      </p:nvGrpSpPr>
+      <p:grpSpPr>
+        <a:xfrm>
+          <a:off x="0" y="0"/>
+          <a:ext cx="0" cy="0"/>
+          <a:chOff x="0" y="0"/>
+          <a:chExt cx="0" cy="0"/>
+        </a:xfrm>
+      </p:grpSpPr>
+      <p:sp>
+        <p:nvSpPr>
+          <p:cNvPr id="2" name="Title 1">
+            <a:extLst>
+              <a:ext uri="{FF2B5EF4-FFF2-40B4-BE49-F238E27FC236}">
+                <a16:creationId xmlns:a16="http://schemas.microsoft.com/office/drawing/2014/main" id="{A077CE77-74E2-46F6-9618-3BC76F4EA89C}"/>
+              </a:ext>
+            </a:extLst>
+          </p:cNvPr>
+          <p:cNvSpPr>
+            <a:spLocks noGrp="1"/>
+          </p:cNvSpPr>
+          <p:nvPr>
+            <p:ph type="title"/>
+          </p:nvPr>
+        </p:nvSpPr>
+        <p:spPr/>
+        <p:txBody>
+          <a:bodyPr/>
+          <a:lstStyle/>
+          <a:p>
+            <a:r>
+              <a:rPr lang="en-HK" dirty="0"/>
+              <a:t>Shuffle the data</a:t>
+            </a:r>
+          </a:p>
+        </p:txBody>
+      </p:sp>
+      <p:sp>
+        <p:nvSpPr>
+          <p:cNvPr id="3" name="Text Placeholder 2">
+            <a:extLst>
+              <a:ext uri="{FF2B5EF4-FFF2-40B4-BE49-F238E27FC236}">
+                <a16:creationId xmlns:a16="http://schemas.microsoft.com/office/drawing/2014/main" id="{55F13073-7ABE-4B63-9F77-62F630A2380B}"/>
+              </a:ext>
+            </a:extLst>
+          </p:cNvPr>
+          <p:cNvSpPr>
+            <a:spLocks noGrp="1"/>
+          </p:cNvSpPr>
+          <p:nvPr>
+            <p:ph type="body" sz="quarter" idx="14"/>
+          </p:nvPr>
+        </p:nvSpPr>
+        <p:spPr/>
+        <p:txBody>
+          <a:bodyPr/>
+          <a:lstStyle/>
+          <a:p>
+            <a:pPr marL="285750" indent="-285750">
+              <a:buFont typeface="Arial" panose="020B0604020202020204" pitchFamily="34" charset="0"/>
+              <a:buChar char="•"/>
+            </a:pPr>
+            <a:r>
+              <a:rPr lang="en-HK" dirty="0"/>
+              <a:t>Append the class back to the data </a:t>
+            </a:r>
+          </a:p>
+          <a:p>
+            <a:pPr marL="285750" indent="-285750">
+              <a:buFont typeface="Arial" panose="020B0604020202020204" pitchFamily="34" charset="0"/>
+              <a:buChar char="•"/>
+            </a:pPr>
+            <a:r>
+              <a:rPr lang="en-HK" dirty="0"/>
+              <a:t>Shuffle using </a:t>
+            </a:r>
+            <a:r>
+              <a:rPr lang="en-HK" dirty="0" err="1"/>
+              <a:t>pandas.DataFrame.sample</a:t>
+            </a:r>
+            <a:r>
+              <a:rPr lang="en-HK" dirty="0"/>
+              <a:t> with frac=1</a:t>
+            </a:r>
+          </a:p>
+        </p:txBody>
+      </p:sp>
+      <p:sp>
+        <p:nvSpPr>
+          <p:cNvPr id="4" name="Picture Placeholder 3">
+            <a:extLst>
+              <a:ext uri="{FF2B5EF4-FFF2-40B4-BE49-F238E27FC236}">
+                <a16:creationId xmlns:a16="http://schemas.microsoft.com/office/drawing/2014/main" id="{D461ADDD-61A5-495E-9AF7-0E6BF23C4BC8}"/>
+              </a:ext>
+            </a:extLst>
+          </p:cNvPr>
+          <p:cNvSpPr>
+            <a:spLocks noGrp="1"/>
+          </p:cNvSpPr>
+          <p:nvPr>
+            <p:ph type="pic" sz="quarter" idx="15"/>
+          </p:nvPr>
+        </p:nvSpPr>
+        <p:spPr/>
+      </p:sp>
+      <p:pic>
+        <p:nvPicPr>
+          <p:cNvPr id="6" name="Picture 5">
+            <a:extLst>
+              <a:ext uri="{FF2B5EF4-FFF2-40B4-BE49-F238E27FC236}">
+                <a16:creationId xmlns:a16="http://schemas.microsoft.com/office/drawing/2014/main" id="{EEC5EF60-C152-4104-ACB2-DA4681886CBA}"/>
+              </a:ext>
+            </a:extLst>
+          </p:cNvPr>
+          <p:cNvPicPr>
+            <a:picLocks noChangeAspect="1"/>
+          </p:cNvPicPr>
+          <p:nvPr/>
+        </p:nvPicPr>
+        <p:blipFill>
+          <a:blip r:embed="rId2"/>
+          <a:stretch>
+            <a:fillRect/>
+          </a:stretch>
+        </p:blipFill>
+        <p:spPr>
+          <a:xfrm>
+            <a:off x="7077885" y="369614"/>
+            <a:ext cx="4763165" cy="2333951"/>
+          </a:xfrm>
+          <a:prstGeom prst="rect">
+            <a:avLst/>
+          </a:prstGeom>
+        </p:spPr>
+      </p:pic>
+      <p:pic>
+        <p:nvPicPr>
+          <p:cNvPr id="10" name="Picture 9">
+            <a:extLst>
+              <a:ext uri="{FF2B5EF4-FFF2-40B4-BE49-F238E27FC236}">
+                <a16:creationId xmlns:a16="http://schemas.microsoft.com/office/drawing/2014/main" id="{3AD47CB7-1FEC-448F-8F94-DFF6BF0C5144}"/>
+              </a:ext>
+            </a:extLst>
+          </p:cNvPr>
+          <p:cNvPicPr>
+            <a:picLocks noChangeAspect="1"/>
+          </p:cNvPicPr>
+          <p:nvPr/>
+        </p:nvPicPr>
+        <p:blipFill>
+          <a:blip r:embed="rId3"/>
+          <a:stretch>
+            <a:fillRect/>
+          </a:stretch>
+        </p:blipFill>
+        <p:spPr>
+          <a:xfrm>
+            <a:off x="7178040" y="2849380"/>
+            <a:ext cx="4210638" cy="3019846"/>
+          </a:xfrm>
+          <a:prstGeom prst="rect">
+            <a:avLst/>
+          </a:prstGeom>
+        </p:spPr>
+      </p:pic>
+    </p:spTree>
+    <p:extLst>
+      <p:ext uri="{BB962C8B-B14F-4D97-AF65-F5344CB8AC3E}">
+        <p14:creationId xmlns:p14="http://schemas.microsoft.com/office/powerpoint/2010/main" val="3283643504"/>
+      </p:ext>
+    </p:extLst>
+  </p:cSld>
+  <p:clrMapOvr>
+    <a:masterClrMapping/>
+  </p:clrMapOvr>
+</p:sld>
+</file>
+
+<file path=ppt/slides/slide9.xml><?xml version="1.0" encoding="utf-8"?>
+<p:sld xmlns:a="http://schemas.openxmlformats.org/drawingml/2006/main" xmlns:r="http://schemas.openxmlformats.org/officeDocument/2006/relationships" xmlns:p="http://schemas.openxmlformats.org/presentationml/2006/main">
+  <p:cSld>
+    <p:spTree>
+      <p:nvGrpSpPr>
+        <p:cNvPr id="1" name=""/>
+        <p:cNvGrpSpPr/>
+        <p:nvPr/>
+      </p:nvGrpSpPr>
+      <p:grpSpPr>
+        <a:xfrm>
+          <a:off x="0" y="0"/>
+          <a:ext cx="0" cy="0"/>
+          <a:chOff x="0" y="0"/>
+          <a:chExt cx="0" cy="0"/>
+        </a:xfrm>
+      </p:grpSpPr>
+      <p:sp>
+        <p:nvSpPr>
+          <p:cNvPr id="2" name="Title 1">
+            <a:extLst>
+              <a:ext uri="{FF2B5EF4-FFF2-40B4-BE49-F238E27FC236}">
+                <a16:creationId xmlns:a16="http://schemas.microsoft.com/office/drawing/2014/main" id="{7655276E-1A8F-469B-A6E7-014003C704AF}"/>
+              </a:ext>
+            </a:extLst>
+          </p:cNvPr>
+          <p:cNvSpPr>
+            <a:spLocks noGrp="1"/>
+          </p:cNvSpPr>
+          <p:nvPr>
+            <p:ph type="title"/>
+          </p:nvPr>
+        </p:nvSpPr>
+        <p:spPr/>
+        <p:txBody>
+          <a:bodyPr/>
+          <a:lstStyle/>
+          <a:p>
+            <a:r>
+              <a:rPr lang="en-HK" dirty="0"/>
+              <a:t>Test training split</a:t>
+            </a:r>
+          </a:p>
+        </p:txBody>
+      </p:sp>
+      <p:sp>
+        <p:nvSpPr>
+          <p:cNvPr id="3" name="Text Placeholder 2">
+            <a:extLst>
+              <a:ext uri="{FF2B5EF4-FFF2-40B4-BE49-F238E27FC236}">
+                <a16:creationId xmlns:a16="http://schemas.microsoft.com/office/drawing/2014/main" id="{7DD66F6A-CA52-4E9F-A41B-1E0A644C6936}"/>
+              </a:ext>
+            </a:extLst>
+          </p:cNvPr>
+          <p:cNvSpPr>
+            <a:spLocks noGrp="1"/>
+          </p:cNvSpPr>
+          <p:nvPr>
+            <p:ph type="body" sz="quarter" idx="14"/>
+          </p:nvPr>
+        </p:nvSpPr>
+        <p:spPr/>
+        <p:txBody>
+          <a:bodyPr/>
+          <a:lstStyle/>
+          <a:p>
+            <a:pPr marL="285750" indent="-285750">
+              <a:buFont typeface="Arial" panose="020B0604020202020204" pitchFamily="34" charset="0"/>
+              <a:buChar char="•"/>
+            </a:pPr>
+            <a:r>
+              <a:rPr lang="en-HK" dirty="0"/>
+              <a:t>Split the data into 75% training data and 25% of testing data</a:t>
+            </a:r>
+          </a:p>
+          <a:p>
+            <a:pPr marL="285750" indent="-285750">
+              <a:buFont typeface="Arial" panose="020B0604020202020204" pitchFamily="34" charset="0"/>
+              <a:buChar char="•"/>
+            </a:pPr>
+            <a:r>
+              <a:rPr lang="en-HK" dirty="0"/>
+              <a:t>Total # of data = 370</a:t>
+            </a:r>
+          </a:p>
+          <a:p>
+            <a:pPr marL="285750" indent="-285750">
+              <a:buFont typeface="Arial" panose="020B0604020202020204" pitchFamily="34" charset="0"/>
+              <a:buChar char="•"/>
+            </a:pPr>
+            <a:r>
+              <a:rPr lang="en-HK" dirty="0"/>
+              <a:t># of training data = 370*0.75 = 278</a:t>
+            </a:r>
+          </a:p>
+          <a:p>
+            <a:pPr marL="285750" indent="-285750">
+              <a:buFont typeface="Arial" panose="020B0604020202020204" pitchFamily="34" charset="0"/>
+              <a:buChar char="•"/>
+            </a:pPr>
+            <a:r>
+              <a:rPr lang="en-HK" dirty="0"/>
+              <a:t># of testing data = 370-278 = 92</a:t>
+            </a:r>
+          </a:p>
+          <a:p>
+            <a:pPr marL="285750" indent="-285750">
+              <a:buFont typeface="Arial" panose="020B0604020202020204" pitchFamily="34" charset="0"/>
+              <a:buChar char="•"/>
+            </a:pPr>
+            <a:r>
+              <a:rPr lang="en-HK" dirty="0"/>
+              <a:t>Split using pandas.DataFrame.iloc</a:t>
+            </a:r>
+          </a:p>
+        </p:txBody>
+      </p:sp>
+      <p:sp>
+        <p:nvSpPr>
+          <p:cNvPr id="4" name="Picture Placeholder 3">
+            <a:extLst>
+              <a:ext uri="{FF2B5EF4-FFF2-40B4-BE49-F238E27FC236}">
+                <a16:creationId xmlns:a16="http://schemas.microsoft.com/office/drawing/2014/main" id="{CD5E0C91-C0EA-4EC0-8996-50F0F75D04E8}"/>
+              </a:ext>
+            </a:extLst>
+          </p:cNvPr>
+          <p:cNvSpPr>
+            <a:spLocks noGrp="1"/>
+          </p:cNvSpPr>
+          <p:nvPr>
+            <p:ph type="pic" sz="quarter" idx="15"/>
+          </p:nvPr>
+        </p:nvSpPr>
+        <p:spPr/>
+      </p:sp>
+      <p:pic>
+        <p:nvPicPr>
+          <p:cNvPr id="6" name="Picture 5">
+            <a:extLst>
+              <a:ext uri="{FF2B5EF4-FFF2-40B4-BE49-F238E27FC236}">
+                <a16:creationId xmlns:a16="http://schemas.microsoft.com/office/drawing/2014/main" id="{B0A958C8-C796-4699-940F-D510CC312EFF}"/>
+              </a:ext>
+            </a:extLst>
+          </p:cNvPr>
+          <p:cNvPicPr>
+            <a:picLocks noChangeAspect="1"/>
+          </p:cNvPicPr>
+          <p:nvPr/>
+        </p:nvPicPr>
+        <p:blipFill>
+          <a:blip r:embed="rId2"/>
+          <a:stretch>
+            <a:fillRect/>
+          </a:stretch>
+        </p:blipFill>
+        <p:spPr>
+          <a:xfrm>
+            <a:off x="5591789" y="281794"/>
+            <a:ext cx="5826284" cy="2884790"/>
+          </a:xfrm>
+          <a:prstGeom prst="rect">
+            <a:avLst/>
+          </a:prstGeom>
+        </p:spPr>
+      </p:pic>
+      <p:pic>
+        <p:nvPicPr>
+          <p:cNvPr id="8" name="Picture 7">
+            <a:extLst>
+              <a:ext uri="{FF2B5EF4-FFF2-40B4-BE49-F238E27FC236}">
+                <a16:creationId xmlns:a16="http://schemas.microsoft.com/office/drawing/2014/main" id="{F8B6ACEB-4CB4-422F-93C0-710035BDFC8C}"/>
+              </a:ext>
+            </a:extLst>
+          </p:cNvPr>
+          <p:cNvPicPr>
+            <a:picLocks noChangeAspect="1"/>
+          </p:cNvPicPr>
+          <p:nvPr/>
+        </p:nvPicPr>
+        <p:blipFill>
+          <a:blip r:embed="rId3"/>
+          <a:stretch>
+            <a:fillRect/>
+          </a:stretch>
+        </p:blipFill>
+        <p:spPr>
+          <a:xfrm>
+            <a:off x="5526370" y="3166584"/>
+            <a:ext cx="2978561" cy="3629654"/>
+          </a:xfrm>
+          <a:prstGeom prst="rect">
+            <a:avLst/>
+          </a:prstGeom>
+        </p:spPr>
+      </p:pic>
+      <p:pic>
+        <p:nvPicPr>
+          <p:cNvPr id="12" name="Picture 11">
+            <a:extLst>
+              <a:ext uri="{FF2B5EF4-FFF2-40B4-BE49-F238E27FC236}">
+                <a16:creationId xmlns:a16="http://schemas.microsoft.com/office/drawing/2014/main" id="{9FD3887D-D081-4767-B4BD-4FE74CD882FB}"/>
+              </a:ext>
+            </a:extLst>
+          </p:cNvPr>
+          <p:cNvPicPr>
+            <a:picLocks noChangeAspect="1"/>
+          </p:cNvPicPr>
+          <p:nvPr/>
+        </p:nvPicPr>
+        <p:blipFill>
+          <a:blip r:embed="rId4"/>
+          <a:stretch>
+            <a:fillRect/>
+          </a:stretch>
+        </p:blipFill>
+        <p:spPr>
+          <a:xfrm>
+            <a:off x="8504931" y="3487212"/>
+            <a:ext cx="3162741" cy="3191320"/>
+          </a:xfrm>
+          <a:prstGeom prst="rect">
+            <a:avLst/>
+          </a:prstGeom>
+        </p:spPr>
+      </p:pic>
+    </p:spTree>
+    <p:extLst>
+      <p:ext uri="{BB962C8B-B14F-4D97-AF65-F5344CB8AC3E}">
+        <p14:creationId xmlns:p14="http://schemas.microsoft.com/office/powerpoint/2010/main" val="3354764261"/>
       </p:ext>
     </p:extLst>
   </p:cSld>

</xml_diff>